<commit_message>
deleted unused videos. added non-watermark vid. fixed name and reference
</commit_message>
<xml_diff>
--- a/Presentation.pptx
+++ b/Presentation.pptx
@@ -269,7 +269,7 @@
           <a:p>
             <a:fld id="{11EAACC7-3B3F-47D1-959A-EF58926E955E}" type="datetimeFigureOut">
               <a:rPr lang="en-US" smtClean="0"/>
-              <a:t>11/28/2020</a:t>
+              <a:t>12/1/2020</a:t>
             </a:fld>
             <a:endParaRPr lang="en-US"/>
           </a:p>
@@ -826,7 +826,7 @@
           <a:p>
             <a:fld id="{11EAACC7-3B3F-47D1-959A-EF58926E955E}" type="datetimeFigureOut">
               <a:rPr lang="en-US" smtClean="0"/>
-              <a:t>11/28/2020</a:t>
+              <a:t>12/1/2020</a:t>
             </a:fld>
             <a:endParaRPr lang="en-US"/>
           </a:p>
@@ -921,6 +921,54 @@
               <a:t>‹#›</a:t>
             </a:fld>
             <a:endParaRPr lang="en-US"/>
+          </a:p>
+        </p:txBody>
+      </p:sp>
+      <p:sp>
+        <p:nvSpPr>
+          <p:cNvPr id="7" name="MSIPCMContentMarking" descr="{&quot;HashCode&quot;:1249950703,&quot;Placement&quot;:&quot;Footer&quot;,&quot;Top&quot;:519.343,&quot;Left&quot;:425.299774,&quot;SlideWidth&quot;:960,&quot;SlideHeight&quot;:540}">
+            <a:extLst>
+              <a:ext uri="{FF2B5EF4-FFF2-40B4-BE49-F238E27FC236}">
+                <a16:creationId xmlns:a16="http://schemas.microsoft.com/office/drawing/2014/main" id="{14C4D812-6C52-438A-9B37-170F2EDACA54}"/>
+              </a:ext>
+            </a:extLst>
+          </p:cNvPr>
+          <p:cNvSpPr txBox="1"/>
+          <p:nvPr userDrawn="1"/>
+        </p:nvSpPr>
+        <p:spPr>
+          <a:xfrm>
+            <a:off x="5401307" y="6595656"/>
+            <a:ext cx="1389387" cy="262344"/>
+          </a:xfrm>
+          <a:prstGeom prst="rect">
+            <a:avLst/>
+          </a:prstGeom>
+          <a:noFill/>
+        </p:spPr>
+        <p:txBody>
+          <a:bodyPr vert="horz" wrap="square" lIns="0" tIns="0" rIns="0" bIns="0" rtlCol="0" anchor="ctr" anchorCtr="1">
+            <a:spAutoFit/>
+          </a:bodyPr>
+          <a:lstStyle/>
+          <a:p>
+            <a:pPr algn="ctr">
+              <a:spcBef>
+                <a:spcPts val="0"/>
+              </a:spcBef>
+              <a:spcAft>
+                <a:spcPts val="0"/>
+              </a:spcAft>
+            </a:pPr>
+            <a:r>
+              <a:rPr lang="en-US" sz="1000">
+                <a:solidFill>
+                  <a:srgbClr val="000000"/>
+                </a:solidFill>
+                <a:latin typeface="Calibri" panose="020F0502020204030204" pitchFamily="34" charset="0"/>
+              </a:rPr>
+              <a:t>Classified as Business</a:t>
+            </a:r>
           </a:p>
         </p:txBody>
       </p:sp>
@@ -3463,8 +3511,12 @@
               <a:buChar char="•"/>
             </a:pPr>
             <a:r>
+              <a:rPr lang="en-US"/>
+              <a:t>Song </a:t>
+            </a:r>
+            <a:r>
               <a:rPr lang="en-US" dirty="0"/>
-              <a:t>Existing Data Required No cleaning</a:t>
+              <a:t>Data Required No cleaning</a:t>
             </a:r>
           </a:p>
           <a:p>

</xml_diff>